<commit_message>
create slide layout for title and chart
</commit_message>
<xml_diff>
--- a/doc/template.pptx
+++ b/doc/template.pptx
@@ -256,7 +256,7 @@
           <a:p>
             <a:fld id="{4824A038-BFCD-4DFC-BB56-4BC56F04C4BF}" type="datetimeFigureOut">
               <a:rPr lang="en-US" smtClean="0"/>
-              <a:t>1/11/2022</a:t>
+              <a:t>1/12/2022</a:t>
             </a:fld>
             <a:endParaRPr lang="en-US"/>
           </a:p>
@@ -330,6 +330,294 @@
 </file>
 
 <file path=ppt/slideLayouts/slideLayout10.xml><?xml version="1.0" encoding="utf-8"?>
+<p:sldLayout xmlns:a="http://schemas.openxmlformats.org/drawingml/2006/main" xmlns:r="http://schemas.openxmlformats.org/officeDocument/2006/relationships" xmlns:p="http://schemas.openxmlformats.org/presentationml/2006/main" type="picTx" preserve="1">
+  <p:cSld name="Picture with Caption">
+    <p:spTree>
+      <p:nvGrpSpPr>
+        <p:cNvPr id="1" name=""/>
+        <p:cNvGrpSpPr/>
+        <p:nvPr/>
+      </p:nvGrpSpPr>
+      <p:grpSpPr>
+        <a:xfrm>
+          <a:off x="0" y="0"/>
+          <a:ext cx="0" cy="0"/>
+          <a:chOff x="0" y="0"/>
+          <a:chExt cx="0" cy="0"/>
+        </a:xfrm>
+      </p:grpSpPr>
+      <p:sp>
+        <p:nvSpPr>
+          <p:cNvPr id="2" name="Title 1">
+            <a:extLst>
+              <a:ext uri="{FF2B5EF4-FFF2-40B4-BE49-F238E27FC236}">
+                <a16:creationId xmlns:a16="http://schemas.microsoft.com/office/drawing/2014/main" id="{11323892-0A7C-473F-A95A-63AD97F8411C}"/>
+              </a:ext>
+            </a:extLst>
+          </p:cNvPr>
+          <p:cNvSpPr>
+            <a:spLocks noGrp="1"/>
+          </p:cNvSpPr>
+          <p:nvPr>
+            <p:ph type="title"/>
+          </p:nvPr>
+        </p:nvSpPr>
+        <p:spPr>
+          <a:xfrm>
+            <a:off x="839788" y="457200"/>
+            <a:ext cx="3932237" cy="1600200"/>
+          </a:xfrm>
+        </p:spPr>
+        <p:txBody>
+          <a:bodyPr anchor="b"/>
+          <a:lstStyle>
+            <a:lvl1pPr>
+              <a:defRPr sz="3200"/>
+            </a:lvl1pPr>
+          </a:lstStyle>
+          <a:p>
+            <a:r>
+              <a:rPr lang="en-US"/>
+              <a:t>Click to edit Master title style</a:t>
+            </a:r>
+          </a:p>
+        </p:txBody>
+      </p:sp>
+      <p:sp>
+        <p:nvSpPr>
+          <p:cNvPr id="3" name="Picture Placeholder 2">
+            <a:extLst>
+              <a:ext uri="{FF2B5EF4-FFF2-40B4-BE49-F238E27FC236}">
+                <a16:creationId xmlns:a16="http://schemas.microsoft.com/office/drawing/2014/main" id="{73CB8895-24EA-49E6-B644-5B8A98597DF7}"/>
+              </a:ext>
+            </a:extLst>
+          </p:cNvPr>
+          <p:cNvSpPr>
+            <a:spLocks noGrp="1"/>
+          </p:cNvSpPr>
+          <p:nvPr>
+            <p:ph type="pic" idx="1"/>
+          </p:nvPr>
+        </p:nvSpPr>
+        <p:spPr>
+          <a:xfrm>
+            <a:off x="5183188" y="987425"/>
+            <a:ext cx="6172200" cy="4873625"/>
+          </a:xfrm>
+        </p:spPr>
+        <p:txBody>
+          <a:bodyPr/>
+          <a:lstStyle>
+            <a:lvl1pPr marL="0" indent="0">
+              <a:buNone/>
+              <a:defRPr sz="3200"/>
+            </a:lvl1pPr>
+            <a:lvl2pPr marL="457200" indent="0">
+              <a:buNone/>
+              <a:defRPr sz="2800"/>
+            </a:lvl2pPr>
+            <a:lvl3pPr marL="914400" indent="0">
+              <a:buNone/>
+              <a:defRPr sz="2400"/>
+            </a:lvl3pPr>
+            <a:lvl4pPr marL="1371600" indent="0">
+              <a:buNone/>
+              <a:defRPr sz="2000"/>
+            </a:lvl4pPr>
+            <a:lvl5pPr marL="1828800" indent="0">
+              <a:buNone/>
+              <a:defRPr sz="2000"/>
+            </a:lvl5pPr>
+            <a:lvl6pPr marL="2286000" indent="0">
+              <a:buNone/>
+              <a:defRPr sz="2000"/>
+            </a:lvl6pPr>
+            <a:lvl7pPr marL="2743200" indent="0">
+              <a:buNone/>
+              <a:defRPr sz="2000"/>
+            </a:lvl7pPr>
+            <a:lvl8pPr marL="3200400" indent="0">
+              <a:buNone/>
+              <a:defRPr sz="2000"/>
+            </a:lvl8pPr>
+            <a:lvl9pPr marL="3657600" indent="0">
+              <a:buNone/>
+              <a:defRPr sz="2000"/>
+            </a:lvl9pPr>
+          </a:lstStyle>
+          <a:p>
+            <a:endParaRPr lang="en-US"/>
+          </a:p>
+        </p:txBody>
+      </p:sp>
+      <p:sp>
+        <p:nvSpPr>
+          <p:cNvPr id="4" name="Text Placeholder 3">
+            <a:extLst>
+              <a:ext uri="{FF2B5EF4-FFF2-40B4-BE49-F238E27FC236}">
+                <a16:creationId xmlns:a16="http://schemas.microsoft.com/office/drawing/2014/main" id="{B54CFFCE-B9F1-4895-A35D-3E2D012F720C}"/>
+              </a:ext>
+            </a:extLst>
+          </p:cNvPr>
+          <p:cNvSpPr>
+            <a:spLocks noGrp="1"/>
+          </p:cNvSpPr>
+          <p:nvPr>
+            <p:ph type="body" sz="half" idx="2"/>
+          </p:nvPr>
+        </p:nvSpPr>
+        <p:spPr>
+          <a:xfrm>
+            <a:off x="839788" y="2057400"/>
+            <a:ext cx="3932237" cy="3811588"/>
+          </a:xfrm>
+        </p:spPr>
+        <p:txBody>
+          <a:bodyPr/>
+          <a:lstStyle>
+            <a:lvl1pPr marL="0" indent="0">
+              <a:buNone/>
+              <a:defRPr sz="1600"/>
+            </a:lvl1pPr>
+            <a:lvl2pPr marL="457200" indent="0">
+              <a:buNone/>
+              <a:defRPr sz="1400"/>
+            </a:lvl2pPr>
+            <a:lvl3pPr marL="914400" indent="0">
+              <a:buNone/>
+              <a:defRPr sz="1200"/>
+            </a:lvl3pPr>
+            <a:lvl4pPr marL="1371600" indent="0">
+              <a:buNone/>
+              <a:defRPr sz="1000"/>
+            </a:lvl4pPr>
+            <a:lvl5pPr marL="1828800" indent="0">
+              <a:buNone/>
+              <a:defRPr sz="1000"/>
+            </a:lvl5pPr>
+            <a:lvl6pPr marL="2286000" indent="0">
+              <a:buNone/>
+              <a:defRPr sz="1000"/>
+            </a:lvl6pPr>
+            <a:lvl7pPr marL="2743200" indent="0">
+              <a:buNone/>
+              <a:defRPr sz="1000"/>
+            </a:lvl7pPr>
+            <a:lvl8pPr marL="3200400" indent="0">
+              <a:buNone/>
+              <a:defRPr sz="1000"/>
+            </a:lvl8pPr>
+            <a:lvl9pPr marL="3657600" indent="0">
+              <a:buNone/>
+              <a:defRPr sz="1000"/>
+            </a:lvl9pPr>
+          </a:lstStyle>
+          <a:p>
+            <a:pPr lvl="0"/>
+            <a:r>
+              <a:rPr lang="en-US"/>
+              <a:t>Click to edit Master text styles</a:t>
+            </a:r>
+          </a:p>
+        </p:txBody>
+      </p:sp>
+      <p:sp>
+        <p:nvSpPr>
+          <p:cNvPr id="5" name="Date Placeholder 4">
+            <a:extLst>
+              <a:ext uri="{FF2B5EF4-FFF2-40B4-BE49-F238E27FC236}">
+                <a16:creationId xmlns:a16="http://schemas.microsoft.com/office/drawing/2014/main" id="{60080C6C-A64A-4571-8621-7C8EBDF754AD}"/>
+              </a:ext>
+            </a:extLst>
+          </p:cNvPr>
+          <p:cNvSpPr>
+            <a:spLocks noGrp="1"/>
+          </p:cNvSpPr>
+          <p:nvPr>
+            <p:ph type="dt" sz="half" idx="10"/>
+          </p:nvPr>
+        </p:nvSpPr>
+        <p:spPr/>
+        <p:txBody>
+          <a:bodyPr/>
+          <a:lstStyle/>
+          <a:p>
+            <a:fld id="{4824A038-BFCD-4DFC-BB56-4BC56F04C4BF}" type="datetimeFigureOut">
+              <a:rPr lang="en-US" smtClean="0"/>
+              <a:t>1/12/2022</a:t>
+            </a:fld>
+            <a:endParaRPr lang="en-US"/>
+          </a:p>
+        </p:txBody>
+      </p:sp>
+      <p:sp>
+        <p:nvSpPr>
+          <p:cNvPr id="6" name="Footer Placeholder 5">
+            <a:extLst>
+              <a:ext uri="{FF2B5EF4-FFF2-40B4-BE49-F238E27FC236}">
+                <a16:creationId xmlns:a16="http://schemas.microsoft.com/office/drawing/2014/main" id="{47E660DB-B7EA-4E9F-A33C-419585A42AAF}"/>
+              </a:ext>
+            </a:extLst>
+          </p:cNvPr>
+          <p:cNvSpPr>
+            <a:spLocks noGrp="1"/>
+          </p:cNvSpPr>
+          <p:nvPr>
+            <p:ph type="ftr" sz="quarter" idx="11"/>
+          </p:nvPr>
+        </p:nvSpPr>
+        <p:spPr/>
+        <p:txBody>
+          <a:bodyPr/>
+          <a:lstStyle/>
+          <a:p>
+            <a:endParaRPr lang="en-US"/>
+          </a:p>
+        </p:txBody>
+      </p:sp>
+      <p:sp>
+        <p:nvSpPr>
+          <p:cNvPr id="7" name="Slide Number Placeholder 6">
+            <a:extLst>
+              <a:ext uri="{FF2B5EF4-FFF2-40B4-BE49-F238E27FC236}">
+                <a16:creationId xmlns:a16="http://schemas.microsoft.com/office/drawing/2014/main" id="{97D1E423-3E3B-4F22-AED9-CD76CA96E7AF}"/>
+              </a:ext>
+            </a:extLst>
+          </p:cNvPr>
+          <p:cNvSpPr>
+            <a:spLocks noGrp="1"/>
+          </p:cNvSpPr>
+          <p:nvPr>
+            <p:ph type="sldNum" sz="quarter" idx="12"/>
+          </p:nvPr>
+        </p:nvSpPr>
+        <p:spPr/>
+        <p:txBody>
+          <a:bodyPr/>
+          <a:lstStyle/>
+          <a:p>
+            <a:fld id="{1DC42285-40D0-48BE-B7EB-BBDFE1034E18}" type="slidenum">
+              <a:rPr lang="en-US" smtClean="0"/>
+              <a:t>‹#›</a:t>
+            </a:fld>
+            <a:endParaRPr lang="en-US"/>
+          </a:p>
+        </p:txBody>
+      </p:sp>
+    </p:spTree>
+    <p:extLst>
+      <p:ext uri="{BB962C8B-B14F-4D97-AF65-F5344CB8AC3E}">
+        <p14:creationId xmlns:p14="http://schemas.microsoft.com/office/powerpoint/2010/main" val="552556460"/>
+      </p:ext>
+    </p:extLst>
+  </p:cSld>
+  <p:clrMapOvr>
+    <a:masterClrMapping/>
+  </p:clrMapOvr>
+</p:sldLayout>
+</file>
+
+<file path=ppt/slideLayouts/slideLayout11.xml><?xml version="1.0" encoding="utf-8"?>
 <p:sldLayout xmlns:a="http://schemas.openxmlformats.org/drawingml/2006/main" xmlns:r="http://schemas.openxmlformats.org/officeDocument/2006/relationships" xmlns:p="http://schemas.openxmlformats.org/presentationml/2006/main" type="vertTx" preserve="1">
   <p:cSld name="Title and Vertical Text">
     <p:spTree>
@@ -454,7 +742,7 @@
           <a:p>
             <a:fld id="{4824A038-BFCD-4DFC-BB56-4BC56F04C4BF}" type="datetimeFigureOut">
               <a:rPr lang="en-US" smtClean="0"/>
-              <a:t>1/11/2022</a:t>
+              <a:t>1/12/2022</a:t>
             </a:fld>
             <a:endParaRPr lang="en-US"/>
           </a:p>
@@ -527,7 +815,7 @@
 </p:sldLayout>
 </file>
 
-<file path=ppt/slideLayouts/slideLayout11.xml><?xml version="1.0" encoding="utf-8"?>
+<file path=ppt/slideLayouts/slideLayout12.xml><?xml version="1.0" encoding="utf-8"?>
 <p:sldLayout xmlns:a="http://schemas.openxmlformats.org/drawingml/2006/main" xmlns:r="http://schemas.openxmlformats.org/officeDocument/2006/relationships" xmlns:p="http://schemas.openxmlformats.org/presentationml/2006/main" type="vertTitleAndTx" preserve="1">
   <p:cSld name="Vertical Title and Text">
     <p:spTree>
@@ -662,7 +950,7 @@
           <a:p>
             <a:fld id="{4824A038-BFCD-4DFC-BB56-4BC56F04C4BF}" type="datetimeFigureOut">
               <a:rPr lang="en-US" smtClean="0"/>
-              <a:t>1/11/2022</a:t>
+              <a:t>1/12/2022</a:t>
             </a:fld>
             <a:endParaRPr lang="en-US"/>
           </a:p>
@@ -803,35 +1091,35 @@
           <a:p>
             <a:pPr lvl="0"/>
             <a:r>
-              <a:rPr lang="en-US"/>
+              <a:rPr lang="en-US" dirty="0"/>
               <a:t>Click to edit Master text styles</a:t>
             </a:r>
           </a:p>
           <a:p>
             <a:pPr lvl="1"/>
             <a:r>
-              <a:rPr lang="en-US"/>
+              <a:rPr lang="en-US" dirty="0"/>
               <a:t>Second level</a:t>
             </a:r>
           </a:p>
           <a:p>
             <a:pPr lvl="2"/>
             <a:r>
-              <a:rPr lang="en-US"/>
+              <a:rPr lang="en-US" dirty="0"/>
               <a:t>Third level</a:t>
             </a:r>
           </a:p>
           <a:p>
             <a:pPr lvl="3"/>
             <a:r>
-              <a:rPr lang="en-US"/>
+              <a:rPr lang="en-US" dirty="0"/>
               <a:t>Fourth level</a:t>
             </a:r>
           </a:p>
           <a:p>
             <a:pPr lvl="4"/>
             <a:r>
-              <a:rPr lang="en-US"/>
+              <a:rPr lang="en-US" dirty="0"/>
               <a:t>Fifth level</a:t>
             </a:r>
           </a:p>
@@ -860,7 +1148,7 @@
           <a:p>
             <a:fld id="{4824A038-BFCD-4DFC-BB56-4BC56F04C4BF}" type="datetimeFigureOut">
               <a:rPr lang="en-US" smtClean="0"/>
-              <a:t>1/11/2022</a:t>
+              <a:t>1/12/2022</a:t>
             </a:fld>
             <a:endParaRPr lang="en-US"/>
           </a:p>
@@ -934,6 +1222,145 @@
 </file>
 
 <file path=ppt/slideLayouts/slideLayout3.xml><?xml version="1.0" encoding="utf-8"?>
+<p:sldLayout xmlns:a="http://schemas.openxmlformats.org/drawingml/2006/main" xmlns:r="http://schemas.openxmlformats.org/officeDocument/2006/relationships" xmlns:p="http://schemas.openxmlformats.org/presentationml/2006/main" type="obj" preserve="1">
+  <p:cSld name="Title and Chart">
+    <p:spTree>
+      <p:nvGrpSpPr>
+        <p:cNvPr id="1" name=""/>
+        <p:cNvGrpSpPr/>
+        <p:nvPr/>
+      </p:nvGrpSpPr>
+      <p:grpSpPr>
+        <a:xfrm>
+          <a:off x="0" y="0"/>
+          <a:ext cx="0" cy="0"/>
+          <a:chOff x="0" y="0"/>
+          <a:chExt cx="0" cy="0"/>
+        </a:xfrm>
+      </p:grpSpPr>
+      <p:sp>
+        <p:nvSpPr>
+          <p:cNvPr id="2" name="Title 1">
+            <a:extLst>
+              <a:ext uri="{FF2B5EF4-FFF2-40B4-BE49-F238E27FC236}">
+                <a16:creationId xmlns:a16="http://schemas.microsoft.com/office/drawing/2014/main" id="{BB37C0A7-648C-413C-BEF9-DA99E4C837D9}"/>
+              </a:ext>
+            </a:extLst>
+          </p:cNvPr>
+          <p:cNvSpPr>
+            <a:spLocks noGrp="1"/>
+          </p:cNvSpPr>
+          <p:nvPr>
+            <p:ph type="title"/>
+          </p:nvPr>
+        </p:nvSpPr>
+        <p:spPr>
+          <a:xfrm>
+            <a:off x="612648" y="457200"/>
+            <a:ext cx="10972800" cy="457200"/>
+          </a:xfrm>
+        </p:spPr>
+        <p:txBody>
+          <a:bodyPr>
+            <a:normAutofit/>
+          </a:bodyPr>
+          <a:lstStyle>
+            <a:lvl1pPr>
+              <a:defRPr sz="2400">
+                <a:solidFill>
+                  <a:schemeClr val="tx1">
+                    <a:lumMod val="75000"/>
+                    <a:lumOff val="25000"/>
+                  </a:schemeClr>
+                </a:solidFill>
+                <a:latin typeface="+mn-lt"/>
+              </a:defRPr>
+            </a:lvl1pPr>
+          </a:lstStyle>
+          <a:p>
+            <a:r>
+              <a:rPr lang="en-US" dirty="0"/>
+              <a:t>Click to edit Master title style</a:t>
+            </a:r>
+          </a:p>
+        </p:txBody>
+      </p:sp>
+      <p:sp>
+        <p:nvSpPr>
+          <p:cNvPr id="3" name="Content Placeholder 2">
+            <a:extLst>
+              <a:ext uri="{FF2B5EF4-FFF2-40B4-BE49-F238E27FC236}">
+                <a16:creationId xmlns:a16="http://schemas.microsoft.com/office/drawing/2014/main" id="{870B6371-AF24-4098-907A-2E6214028DB0}"/>
+              </a:ext>
+            </a:extLst>
+          </p:cNvPr>
+          <p:cNvSpPr>
+            <a:spLocks noGrp="1"/>
+          </p:cNvSpPr>
+          <p:nvPr>
+            <p:ph idx="1"/>
+          </p:nvPr>
+        </p:nvSpPr>
+        <p:spPr>
+          <a:xfrm>
+            <a:off x="612648" y="914400"/>
+            <a:ext cx="10972800" cy="5486400"/>
+          </a:xfrm>
+        </p:spPr>
+        <p:txBody>
+          <a:bodyPr/>
+          <a:lstStyle/>
+          <a:p>
+            <a:pPr lvl="0"/>
+            <a:r>
+              <a:rPr lang="en-US" dirty="0"/>
+              <a:t>Click to edit Master text styles</a:t>
+            </a:r>
+          </a:p>
+          <a:p>
+            <a:pPr lvl="1"/>
+            <a:r>
+              <a:rPr lang="en-US" dirty="0"/>
+              <a:t>Second level</a:t>
+            </a:r>
+          </a:p>
+          <a:p>
+            <a:pPr lvl="2"/>
+            <a:r>
+              <a:rPr lang="en-US" dirty="0"/>
+              <a:t>Third level</a:t>
+            </a:r>
+          </a:p>
+          <a:p>
+            <a:pPr lvl="3"/>
+            <a:r>
+              <a:rPr lang="en-US" dirty="0"/>
+              <a:t>Fourth level</a:t>
+            </a:r>
+          </a:p>
+          <a:p>
+            <a:pPr lvl="4"/>
+            <a:r>
+              <a:rPr lang="en-US" dirty="0"/>
+              <a:t>Fifth level</a:t>
+            </a:r>
+          </a:p>
+        </p:txBody>
+      </p:sp>
+    </p:spTree>
+    <p:extLst>
+      <p:ext uri="{BB962C8B-B14F-4D97-AF65-F5344CB8AC3E}">
+        <p14:creationId xmlns:p14="http://schemas.microsoft.com/office/powerpoint/2010/main" val="3699894418"/>
+      </p:ext>
+    </p:extLst>
+  </p:cSld>
+  <p:clrMapOvr>
+    <a:masterClrMapping/>
+  </p:clrMapOvr>
+</p:sldLayout>
+</file>
+
+<file path=ppt/slideLayouts/slideLayout4.xml><?xml version="1.0" encoding="utf-8"?>
 <p:sldLayout xmlns:a="http://schemas.openxmlformats.org/drawingml/2006/main" xmlns:r="http://schemas.openxmlformats.org/officeDocument/2006/relationships" xmlns:p="http://schemas.openxmlformats.org/presentationml/2006/main" type="secHead" preserve="1">
   <p:cSld name="Section Header">
     <p:spTree>
@@ -1135,7 +1562,7 @@
           <a:p>
             <a:fld id="{4824A038-BFCD-4DFC-BB56-4BC56F04C4BF}" type="datetimeFigureOut">
               <a:rPr lang="en-US" smtClean="0"/>
-              <a:t>1/11/2022</a:t>
+              <a:t>1/12/2022</a:t>
             </a:fld>
             <a:endParaRPr lang="en-US"/>
           </a:p>
@@ -1208,7 +1635,7 @@
 </p:sldLayout>
 </file>
 
-<file path=ppt/slideLayouts/slideLayout4.xml><?xml version="1.0" encoding="utf-8"?>
+<file path=ppt/slideLayouts/slideLayout5.xml><?xml version="1.0" encoding="utf-8"?>
 <p:sldLayout xmlns:a="http://schemas.openxmlformats.org/drawingml/2006/main" xmlns:r="http://schemas.openxmlformats.org/officeDocument/2006/relationships" xmlns:p="http://schemas.openxmlformats.org/presentationml/2006/main" type="twoObj" preserve="1">
   <p:cSld name="Two Content">
     <p:spTree>
@@ -1400,7 +1827,7 @@
           <a:p>
             <a:fld id="{4824A038-BFCD-4DFC-BB56-4BC56F04C4BF}" type="datetimeFigureOut">
               <a:rPr lang="en-US" smtClean="0"/>
-              <a:t>1/11/2022</a:t>
+              <a:t>1/12/2022</a:t>
             </a:fld>
             <a:endParaRPr lang="en-US"/>
           </a:p>
@@ -1473,7 +1900,7 @@
 </p:sldLayout>
 </file>
 
-<file path=ppt/slideLayouts/slideLayout5.xml><?xml version="1.0" encoding="utf-8"?>
+<file path=ppt/slideLayouts/slideLayout6.xml><?xml version="1.0" encoding="utf-8"?>
 <p:sldLayout xmlns:a="http://schemas.openxmlformats.org/drawingml/2006/main" xmlns:r="http://schemas.openxmlformats.org/officeDocument/2006/relationships" xmlns:p="http://schemas.openxmlformats.org/presentationml/2006/main" type="twoTxTwoObj" preserve="1">
   <p:cSld name="Comparison">
     <p:spTree>
@@ -1812,7 +2239,7 @@
           <a:p>
             <a:fld id="{4824A038-BFCD-4DFC-BB56-4BC56F04C4BF}" type="datetimeFigureOut">
               <a:rPr lang="en-US" smtClean="0"/>
-              <a:t>1/11/2022</a:t>
+              <a:t>1/12/2022</a:t>
             </a:fld>
             <a:endParaRPr lang="en-US"/>
           </a:p>
@@ -1885,7 +2312,7 @@
 </p:sldLayout>
 </file>
 
-<file path=ppt/slideLayouts/slideLayout6.xml><?xml version="1.0" encoding="utf-8"?>
+<file path=ppt/slideLayouts/slideLayout7.xml><?xml version="1.0" encoding="utf-8"?>
 <p:sldLayout xmlns:a="http://schemas.openxmlformats.org/drawingml/2006/main" xmlns:r="http://schemas.openxmlformats.org/officeDocument/2006/relationships" xmlns:p="http://schemas.openxmlformats.org/presentationml/2006/main" type="titleOnly" preserve="1">
   <p:cSld name="Title Only">
     <p:spTree>
@@ -1953,7 +2380,7 @@
           <a:p>
             <a:fld id="{4824A038-BFCD-4DFC-BB56-4BC56F04C4BF}" type="datetimeFigureOut">
               <a:rPr lang="en-US" smtClean="0"/>
-              <a:t>1/11/2022</a:t>
+              <a:t>1/12/2022</a:t>
             </a:fld>
             <a:endParaRPr lang="en-US"/>
           </a:p>
@@ -2026,7 +2453,7 @@
 </p:sldLayout>
 </file>
 
-<file path=ppt/slideLayouts/slideLayout7.xml><?xml version="1.0" encoding="utf-8"?>
+<file path=ppt/slideLayouts/slideLayout8.xml><?xml version="1.0" encoding="utf-8"?>
 <p:sldLayout xmlns:a="http://schemas.openxmlformats.org/drawingml/2006/main" xmlns:r="http://schemas.openxmlformats.org/officeDocument/2006/relationships" xmlns:p="http://schemas.openxmlformats.org/presentationml/2006/main" type="blank" preserve="1">
   <p:cSld name="Blank">
     <p:spTree>
@@ -2066,7 +2493,7 @@
           <a:p>
             <a:fld id="{4824A038-BFCD-4DFC-BB56-4BC56F04C4BF}" type="datetimeFigureOut">
               <a:rPr lang="en-US" smtClean="0"/>
-              <a:t>1/11/2022</a:t>
+              <a:t>1/12/2022</a:t>
             </a:fld>
             <a:endParaRPr lang="en-US"/>
           </a:p>
@@ -2139,7 +2566,7 @@
 </p:sldLayout>
 </file>
 
-<file path=ppt/slideLayouts/slideLayout8.xml><?xml version="1.0" encoding="utf-8"?>
+<file path=ppt/slideLayouts/slideLayout9.xml><?xml version="1.0" encoding="utf-8"?>
 <p:sldLayout xmlns:a="http://schemas.openxmlformats.org/drawingml/2006/main" xmlns:r="http://schemas.openxmlformats.org/officeDocument/2006/relationships" xmlns:p="http://schemas.openxmlformats.org/presentationml/2006/main" type="objTx" preserve="1">
   <p:cSld name="Content with Caption">
     <p:spTree>
@@ -2377,7 +2804,7 @@
           <a:p>
             <a:fld id="{4824A038-BFCD-4DFC-BB56-4BC56F04C4BF}" type="datetimeFigureOut">
               <a:rPr lang="en-US" smtClean="0"/>
-              <a:t>1/11/2022</a:t>
+              <a:t>1/12/2022</a:t>
             </a:fld>
             <a:endParaRPr lang="en-US"/>
           </a:p>
@@ -2441,294 +2868,6 @@
     <p:extLst>
       <p:ext uri="{BB962C8B-B14F-4D97-AF65-F5344CB8AC3E}">
         <p14:creationId xmlns:p14="http://schemas.microsoft.com/office/powerpoint/2010/main" val="3862009725"/>
-      </p:ext>
-    </p:extLst>
-  </p:cSld>
-  <p:clrMapOvr>
-    <a:masterClrMapping/>
-  </p:clrMapOvr>
-</p:sldLayout>
-</file>
-
-<file path=ppt/slideLayouts/slideLayout9.xml><?xml version="1.0" encoding="utf-8"?>
-<p:sldLayout xmlns:a="http://schemas.openxmlformats.org/drawingml/2006/main" xmlns:r="http://schemas.openxmlformats.org/officeDocument/2006/relationships" xmlns:p="http://schemas.openxmlformats.org/presentationml/2006/main" type="picTx" preserve="1">
-  <p:cSld name="Picture with Caption">
-    <p:spTree>
-      <p:nvGrpSpPr>
-        <p:cNvPr id="1" name=""/>
-        <p:cNvGrpSpPr/>
-        <p:nvPr/>
-      </p:nvGrpSpPr>
-      <p:grpSpPr>
-        <a:xfrm>
-          <a:off x="0" y="0"/>
-          <a:ext cx="0" cy="0"/>
-          <a:chOff x="0" y="0"/>
-          <a:chExt cx="0" cy="0"/>
-        </a:xfrm>
-      </p:grpSpPr>
-      <p:sp>
-        <p:nvSpPr>
-          <p:cNvPr id="2" name="Title 1">
-            <a:extLst>
-              <a:ext uri="{FF2B5EF4-FFF2-40B4-BE49-F238E27FC236}">
-                <a16:creationId xmlns:a16="http://schemas.microsoft.com/office/drawing/2014/main" id="{11323892-0A7C-473F-A95A-63AD97F8411C}"/>
-              </a:ext>
-            </a:extLst>
-          </p:cNvPr>
-          <p:cNvSpPr>
-            <a:spLocks noGrp="1"/>
-          </p:cNvSpPr>
-          <p:nvPr>
-            <p:ph type="title"/>
-          </p:nvPr>
-        </p:nvSpPr>
-        <p:spPr>
-          <a:xfrm>
-            <a:off x="839788" y="457200"/>
-            <a:ext cx="3932237" cy="1600200"/>
-          </a:xfrm>
-        </p:spPr>
-        <p:txBody>
-          <a:bodyPr anchor="b"/>
-          <a:lstStyle>
-            <a:lvl1pPr>
-              <a:defRPr sz="3200"/>
-            </a:lvl1pPr>
-          </a:lstStyle>
-          <a:p>
-            <a:r>
-              <a:rPr lang="en-US"/>
-              <a:t>Click to edit Master title style</a:t>
-            </a:r>
-          </a:p>
-        </p:txBody>
-      </p:sp>
-      <p:sp>
-        <p:nvSpPr>
-          <p:cNvPr id="3" name="Picture Placeholder 2">
-            <a:extLst>
-              <a:ext uri="{FF2B5EF4-FFF2-40B4-BE49-F238E27FC236}">
-                <a16:creationId xmlns:a16="http://schemas.microsoft.com/office/drawing/2014/main" id="{73CB8895-24EA-49E6-B644-5B8A98597DF7}"/>
-              </a:ext>
-            </a:extLst>
-          </p:cNvPr>
-          <p:cNvSpPr>
-            <a:spLocks noGrp="1"/>
-          </p:cNvSpPr>
-          <p:nvPr>
-            <p:ph type="pic" idx="1"/>
-          </p:nvPr>
-        </p:nvSpPr>
-        <p:spPr>
-          <a:xfrm>
-            <a:off x="5183188" y="987425"/>
-            <a:ext cx="6172200" cy="4873625"/>
-          </a:xfrm>
-        </p:spPr>
-        <p:txBody>
-          <a:bodyPr/>
-          <a:lstStyle>
-            <a:lvl1pPr marL="0" indent="0">
-              <a:buNone/>
-              <a:defRPr sz="3200"/>
-            </a:lvl1pPr>
-            <a:lvl2pPr marL="457200" indent="0">
-              <a:buNone/>
-              <a:defRPr sz="2800"/>
-            </a:lvl2pPr>
-            <a:lvl3pPr marL="914400" indent="0">
-              <a:buNone/>
-              <a:defRPr sz="2400"/>
-            </a:lvl3pPr>
-            <a:lvl4pPr marL="1371600" indent="0">
-              <a:buNone/>
-              <a:defRPr sz="2000"/>
-            </a:lvl4pPr>
-            <a:lvl5pPr marL="1828800" indent="0">
-              <a:buNone/>
-              <a:defRPr sz="2000"/>
-            </a:lvl5pPr>
-            <a:lvl6pPr marL="2286000" indent="0">
-              <a:buNone/>
-              <a:defRPr sz="2000"/>
-            </a:lvl6pPr>
-            <a:lvl7pPr marL="2743200" indent="0">
-              <a:buNone/>
-              <a:defRPr sz="2000"/>
-            </a:lvl7pPr>
-            <a:lvl8pPr marL="3200400" indent="0">
-              <a:buNone/>
-              <a:defRPr sz="2000"/>
-            </a:lvl8pPr>
-            <a:lvl9pPr marL="3657600" indent="0">
-              <a:buNone/>
-              <a:defRPr sz="2000"/>
-            </a:lvl9pPr>
-          </a:lstStyle>
-          <a:p>
-            <a:endParaRPr lang="en-US"/>
-          </a:p>
-        </p:txBody>
-      </p:sp>
-      <p:sp>
-        <p:nvSpPr>
-          <p:cNvPr id="4" name="Text Placeholder 3">
-            <a:extLst>
-              <a:ext uri="{FF2B5EF4-FFF2-40B4-BE49-F238E27FC236}">
-                <a16:creationId xmlns:a16="http://schemas.microsoft.com/office/drawing/2014/main" id="{B54CFFCE-B9F1-4895-A35D-3E2D012F720C}"/>
-              </a:ext>
-            </a:extLst>
-          </p:cNvPr>
-          <p:cNvSpPr>
-            <a:spLocks noGrp="1"/>
-          </p:cNvSpPr>
-          <p:nvPr>
-            <p:ph type="body" sz="half" idx="2"/>
-          </p:nvPr>
-        </p:nvSpPr>
-        <p:spPr>
-          <a:xfrm>
-            <a:off x="839788" y="2057400"/>
-            <a:ext cx="3932237" cy="3811588"/>
-          </a:xfrm>
-        </p:spPr>
-        <p:txBody>
-          <a:bodyPr/>
-          <a:lstStyle>
-            <a:lvl1pPr marL="0" indent="0">
-              <a:buNone/>
-              <a:defRPr sz="1600"/>
-            </a:lvl1pPr>
-            <a:lvl2pPr marL="457200" indent="0">
-              <a:buNone/>
-              <a:defRPr sz="1400"/>
-            </a:lvl2pPr>
-            <a:lvl3pPr marL="914400" indent="0">
-              <a:buNone/>
-              <a:defRPr sz="1200"/>
-            </a:lvl3pPr>
-            <a:lvl4pPr marL="1371600" indent="0">
-              <a:buNone/>
-              <a:defRPr sz="1000"/>
-            </a:lvl4pPr>
-            <a:lvl5pPr marL="1828800" indent="0">
-              <a:buNone/>
-              <a:defRPr sz="1000"/>
-            </a:lvl5pPr>
-            <a:lvl6pPr marL="2286000" indent="0">
-              <a:buNone/>
-              <a:defRPr sz="1000"/>
-            </a:lvl6pPr>
-            <a:lvl7pPr marL="2743200" indent="0">
-              <a:buNone/>
-              <a:defRPr sz="1000"/>
-            </a:lvl7pPr>
-            <a:lvl8pPr marL="3200400" indent="0">
-              <a:buNone/>
-              <a:defRPr sz="1000"/>
-            </a:lvl8pPr>
-            <a:lvl9pPr marL="3657600" indent="0">
-              <a:buNone/>
-              <a:defRPr sz="1000"/>
-            </a:lvl9pPr>
-          </a:lstStyle>
-          <a:p>
-            <a:pPr lvl="0"/>
-            <a:r>
-              <a:rPr lang="en-US"/>
-              <a:t>Click to edit Master text styles</a:t>
-            </a:r>
-          </a:p>
-        </p:txBody>
-      </p:sp>
-      <p:sp>
-        <p:nvSpPr>
-          <p:cNvPr id="5" name="Date Placeholder 4">
-            <a:extLst>
-              <a:ext uri="{FF2B5EF4-FFF2-40B4-BE49-F238E27FC236}">
-                <a16:creationId xmlns:a16="http://schemas.microsoft.com/office/drawing/2014/main" id="{60080C6C-A64A-4571-8621-7C8EBDF754AD}"/>
-              </a:ext>
-            </a:extLst>
-          </p:cNvPr>
-          <p:cNvSpPr>
-            <a:spLocks noGrp="1"/>
-          </p:cNvSpPr>
-          <p:nvPr>
-            <p:ph type="dt" sz="half" idx="10"/>
-          </p:nvPr>
-        </p:nvSpPr>
-        <p:spPr/>
-        <p:txBody>
-          <a:bodyPr/>
-          <a:lstStyle/>
-          <a:p>
-            <a:fld id="{4824A038-BFCD-4DFC-BB56-4BC56F04C4BF}" type="datetimeFigureOut">
-              <a:rPr lang="en-US" smtClean="0"/>
-              <a:t>1/11/2022</a:t>
-            </a:fld>
-            <a:endParaRPr lang="en-US"/>
-          </a:p>
-        </p:txBody>
-      </p:sp>
-      <p:sp>
-        <p:nvSpPr>
-          <p:cNvPr id="6" name="Footer Placeholder 5">
-            <a:extLst>
-              <a:ext uri="{FF2B5EF4-FFF2-40B4-BE49-F238E27FC236}">
-                <a16:creationId xmlns:a16="http://schemas.microsoft.com/office/drawing/2014/main" id="{47E660DB-B7EA-4E9F-A33C-419585A42AAF}"/>
-              </a:ext>
-            </a:extLst>
-          </p:cNvPr>
-          <p:cNvSpPr>
-            <a:spLocks noGrp="1"/>
-          </p:cNvSpPr>
-          <p:nvPr>
-            <p:ph type="ftr" sz="quarter" idx="11"/>
-          </p:nvPr>
-        </p:nvSpPr>
-        <p:spPr/>
-        <p:txBody>
-          <a:bodyPr/>
-          <a:lstStyle/>
-          <a:p>
-            <a:endParaRPr lang="en-US"/>
-          </a:p>
-        </p:txBody>
-      </p:sp>
-      <p:sp>
-        <p:nvSpPr>
-          <p:cNvPr id="7" name="Slide Number Placeholder 6">
-            <a:extLst>
-              <a:ext uri="{FF2B5EF4-FFF2-40B4-BE49-F238E27FC236}">
-                <a16:creationId xmlns:a16="http://schemas.microsoft.com/office/drawing/2014/main" id="{97D1E423-3E3B-4F22-AED9-CD76CA96E7AF}"/>
-              </a:ext>
-            </a:extLst>
-          </p:cNvPr>
-          <p:cNvSpPr>
-            <a:spLocks noGrp="1"/>
-          </p:cNvSpPr>
-          <p:nvPr>
-            <p:ph type="sldNum" sz="quarter" idx="12"/>
-          </p:nvPr>
-        </p:nvSpPr>
-        <p:spPr/>
-        <p:txBody>
-          <a:bodyPr/>
-          <a:lstStyle/>
-          <a:p>
-            <a:fld id="{1DC42285-40D0-48BE-B7EB-BBDFE1034E18}" type="slidenum">
-              <a:rPr lang="en-US" smtClean="0"/>
-              <a:t>‹#›</a:t>
-            </a:fld>
-            <a:endParaRPr lang="en-US"/>
-          </a:p>
-        </p:txBody>
-      </p:sp>
-    </p:spTree>
-    <p:extLst>
-      <p:ext uri="{BB962C8B-B14F-4D97-AF65-F5344CB8AC3E}">
-        <p14:creationId xmlns:p14="http://schemas.microsoft.com/office/powerpoint/2010/main" val="552556460"/>
       </p:ext>
     </p:extLst>
   </p:cSld>
@@ -2906,7 +3045,7 @@
           <a:p>
             <a:fld id="{4824A038-BFCD-4DFC-BB56-4BC56F04C4BF}" type="datetimeFigureOut">
               <a:rPr lang="en-US" smtClean="0"/>
-              <a:t>1/11/2022</a:t>
+              <a:t>1/12/2022</a:t>
             </a:fld>
             <a:endParaRPr lang="en-US"/>
           </a:p>
@@ -3013,15 +3152,16 @@
   <p:sldLayoutIdLst>
     <p:sldLayoutId id="2147483649" r:id="rId1"/>
     <p:sldLayoutId id="2147483650" r:id="rId2"/>
-    <p:sldLayoutId id="2147483651" r:id="rId3"/>
-    <p:sldLayoutId id="2147483652" r:id="rId4"/>
-    <p:sldLayoutId id="2147483653" r:id="rId5"/>
-    <p:sldLayoutId id="2147483654" r:id="rId6"/>
-    <p:sldLayoutId id="2147483655" r:id="rId7"/>
-    <p:sldLayoutId id="2147483656" r:id="rId8"/>
-    <p:sldLayoutId id="2147483657" r:id="rId9"/>
-    <p:sldLayoutId id="2147483658" r:id="rId10"/>
-    <p:sldLayoutId id="2147483659" r:id="rId11"/>
+    <p:sldLayoutId id="2147483660" r:id="rId3"/>
+    <p:sldLayoutId id="2147483651" r:id="rId4"/>
+    <p:sldLayoutId id="2147483652" r:id="rId5"/>
+    <p:sldLayoutId id="2147483653" r:id="rId6"/>
+    <p:sldLayoutId id="2147483654" r:id="rId7"/>
+    <p:sldLayoutId id="2147483655" r:id="rId8"/>
+    <p:sldLayoutId id="2147483656" r:id="rId9"/>
+    <p:sldLayoutId id="2147483657" r:id="rId10"/>
+    <p:sldLayoutId id="2147483658" r:id="rId11"/>
+    <p:sldLayoutId id="2147483659" r:id="rId12"/>
   </p:sldLayoutIdLst>
   <p:txStyles>
     <p:titleStyle>

</xml_diff>